<commit_message>
fixed bugs and added descriptions
</commit_message>
<xml_diff>
--- a/Project SMRT idea outline.pptx
+++ b/Project SMRT idea outline.pptx
@@ -261,7 +261,7 @@
           <a:p>
             <a:fld id="{B5CFA72C-CDD0-4D1E-924C-35BC768C26D4}" type="datetimeFigureOut">
               <a:rPr lang="en-AU" smtClean="0"/>
-              <a:t>21/08/2021</a:t>
+              <a:t>22/08/2021</a:t>
             </a:fld>
             <a:endParaRPr lang="en-AU"/>
           </a:p>
@@ -461,7 +461,7 @@
           <a:p>
             <a:fld id="{B5CFA72C-CDD0-4D1E-924C-35BC768C26D4}" type="datetimeFigureOut">
               <a:rPr lang="en-AU" smtClean="0"/>
-              <a:t>21/08/2021</a:t>
+              <a:t>22/08/2021</a:t>
             </a:fld>
             <a:endParaRPr lang="en-AU"/>
           </a:p>
@@ -671,7 +671,7 @@
           <a:p>
             <a:fld id="{B5CFA72C-CDD0-4D1E-924C-35BC768C26D4}" type="datetimeFigureOut">
               <a:rPr lang="en-AU" smtClean="0"/>
-              <a:t>21/08/2021</a:t>
+              <a:t>22/08/2021</a:t>
             </a:fld>
             <a:endParaRPr lang="en-AU"/>
           </a:p>
@@ -871,7 +871,7 @@
           <a:p>
             <a:fld id="{B5CFA72C-CDD0-4D1E-924C-35BC768C26D4}" type="datetimeFigureOut">
               <a:rPr lang="en-AU" smtClean="0"/>
-              <a:t>21/08/2021</a:t>
+              <a:t>22/08/2021</a:t>
             </a:fld>
             <a:endParaRPr lang="en-AU"/>
           </a:p>
@@ -1147,7 +1147,7 @@
           <a:p>
             <a:fld id="{B5CFA72C-CDD0-4D1E-924C-35BC768C26D4}" type="datetimeFigureOut">
               <a:rPr lang="en-AU" smtClean="0"/>
-              <a:t>21/08/2021</a:t>
+              <a:t>22/08/2021</a:t>
             </a:fld>
             <a:endParaRPr lang="en-AU"/>
           </a:p>
@@ -1415,7 +1415,7 @@
           <a:p>
             <a:fld id="{B5CFA72C-CDD0-4D1E-924C-35BC768C26D4}" type="datetimeFigureOut">
               <a:rPr lang="en-AU" smtClean="0"/>
-              <a:t>21/08/2021</a:t>
+              <a:t>22/08/2021</a:t>
             </a:fld>
             <a:endParaRPr lang="en-AU"/>
           </a:p>
@@ -1830,7 +1830,7 @@
           <a:p>
             <a:fld id="{B5CFA72C-CDD0-4D1E-924C-35BC768C26D4}" type="datetimeFigureOut">
               <a:rPr lang="en-AU" smtClean="0"/>
-              <a:t>21/08/2021</a:t>
+              <a:t>22/08/2021</a:t>
             </a:fld>
             <a:endParaRPr lang="en-AU"/>
           </a:p>
@@ -1972,7 +1972,7 @@
           <a:p>
             <a:fld id="{B5CFA72C-CDD0-4D1E-924C-35BC768C26D4}" type="datetimeFigureOut">
               <a:rPr lang="en-AU" smtClean="0"/>
-              <a:t>21/08/2021</a:t>
+              <a:t>22/08/2021</a:t>
             </a:fld>
             <a:endParaRPr lang="en-AU"/>
           </a:p>
@@ -2085,7 +2085,7 @@
           <a:p>
             <a:fld id="{B5CFA72C-CDD0-4D1E-924C-35BC768C26D4}" type="datetimeFigureOut">
               <a:rPr lang="en-AU" smtClean="0"/>
-              <a:t>21/08/2021</a:t>
+              <a:t>22/08/2021</a:t>
             </a:fld>
             <a:endParaRPr lang="en-AU"/>
           </a:p>
@@ -2398,7 +2398,7 @@
           <a:p>
             <a:fld id="{B5CFA72C-CDD0-4D1E-924C-35BC768C26D4}" type="datetimeFigureOut">
               <a:rPr lang="en-AU" smtClean="0"/>
-              <a:t>21/08/2021</a:t>
+              <a:t>22/08/2021</a:t>
             </a:fld>
             <a:endParaRPr lang="en-AU"/>
           </a:p>
@@ -2687,7 +2687,7 @@
           <a:p>
             <a:fld id="{B5CFA72C-CDD0-4D1E-924C-35BC768C26D4}" type="datetimeFigureOut">
               <a:rPr lang="en-AU" smtClean="0"/>
-              <a:t>21/08/2021</a:t>
+              <a:t>22/08/2021</a:t>
             </a:fld>
             <a:endParaRPr lang="en-AU"/>
           </a:p>
@@ -2930,7 +2930,7 @@
           <a:p>
             <a:fld id="{B5CFA72C-CDD0-4D1E-924C-35BC768C26D4}" type="datetimeFigureOut">
               <a:rPr lang="en-AU" smtClean="0"/>
-              <a:t>21/08/2021</a:t>
+              <a:t>22/08/2021</a:t>
             </a:fld>
             <a:endParaRPr lang="en-AU"/>
           </a:p>
@@ -4560,8 +4560,21 @@
                   <a:schemeClr val="tx1"/>
                 </a:solidFill>
               </a:rPr>
-              <a:t>Ask citizens (users) what are things they care about</a:t>
-            </a:r>
+              <a:t>Get survey categories from key ABS surveys using ABS </a:t>
+            </a:r>
+            <a:r>
+              <a:rPr lang="en-US" dirty="0" err="1">
+                <a:solidFill>
+                  <a:schemeClr val="tx1"/>
+                </a:solidFill>
+              </a:rPr>
+              <a:t>api</a:t>
+            </a:r>
+            <a:endParaRPr lang="en-US" dirty="0">
+              <a:solidFill>
+                <a:schemeClr val="tx1"/>
+              </a:solidFill>
+            </a:endParaRPr>
           </a:p>
         </p:txBody>
       </p:sp>

</xml_diff>